<commit_message>
Update FGVR presentation with last version before the last class
</commit_message>
<xml_diff>
--- a/presentation/FGV-MBA - Aplicações Estatística Espacial - Grupo 2 - Homenagem.pptx
+++ b/presentation/FGV-MBA - Aplicações Estatística Espacial - Grupo 2 - Homenagem.pptx
@@ -8,14 +8,20 @@
     <p:sldMasterId id="2147483657" r:id="rId4"/>
   </p:sldMasterIdLst>
   <p:notesMasterIdLst>
-    <p:notesMasterId r:id="rId7"/>
+    <p:notesMasterId r:id="rId13"/>
   </p:notesMasterIdLst>
   <p:handoutMasterIdLst>
-    <p:handoutMasterId r:id="rId8"/>
+    <p:handoutMasterId r:id="rId14"/>
   </p:handoutMasterIdLst>
   <p:sldIdLst>
     <p:sldId id="351" r:id="rId5"/>
     <p:sldId id="361" r:id="rId6"/>
+    <p:sldId id="362" r:id="rId7"/>
+    <p:sldId id="365" r:id="rId8"/>
+    <p:sldId id="366" r:id="rId9"/>
+    <p:sldId id="368" r:id="rId10"/>
+    <p:sldId id="364" r:id="rId11"/>
+    <p:sldId id="363" r:id="rId12"/>
   </p:sldIdLst>
   <p:sldSz cx="12192000" cy="6858000"/>
   <p:notesSz cx="6858000" cy="9144000"/>
@@ -121,6 +127,12 @@
           <p14:sldIdLst>
             <p14:sldId id="351"/>
             <p14:sldId id="361"/>
+            <p14:sldId id="362"/>
+            <p14:sldId id="365"/>
+            <p14:sldId id="366"/>
+            <p14:sldId id="368"/>
+            <p14:sldId id="364"/>
+            <p14:sldId id="363"/>
           </p14:sldIdLst>
         </p14:section>
       </p14:sectionLst>
@@ -4439,7 +4451,7 @@
             <a:fld id="{B26FF4F9-2FBB-4F7A-9697-05FA74F11F3B}" type="datetimeFigureOut">
               <a:rPr lang="pt-BR" smtClean="0"/>
               <a:pPr/>
-              <a:t>18/06/2020</a:t>
+              <a:t>23/06/2020</a:t>
             </a:fld>
             <a:endParaRPr lang="pt-BR"/>
           </a:p>
@@ -4618,7 +4630,7 @@
             <a:fld id="{1820D135-1270-41BD-8A14-B5B3DA62A4B5}" type="datetimeFigureOut">
               <a:rPr lang="pt-BR" smtClean="0"/>
               <a:pPr/>
-              <a:t>18/06/2020</a:t>
+              <a:t>23/06/2020</a:t>
             </a:fld>
             <a:endParaRPr lang="pt-BR"/>
           </a:p>
@@ -8968,6 +8980,1878 @@
 </p:sld>
 </file>
 
+<file path=ppt/slides/slide3.xml><?xml version="1.0" encoding="utf-8"?>
+<p:sld xmlns:a="http://schemas.openxmlformats.org/drawingml/2006/main" xmlns:r="http://schemas.openxmlformats.org/officeDocument/2006/relationships" xmlns:p="http://schemas.openxmlformats.org/presentationml/2006/main">
+  <p:cSld>
+    <p:spTree>
+      <p:nvGrpSpPr>
+        <p:cNvPr id="1" name=""/>
+        <p:cNvGrpSpPr/>
+        <p:nvPr/>
+      </p:nvGrpSpPr>
+      <p:grpSpPr>
+        <a:xfrm>
+          <a:off x="0" y="0"/>
+          <a:ext cx="0" cy="0"/>
+          <a:chOff x="0" y="0"/>
+          <a:chExt cx="0" cy="0"/>
+        </a:xfrm>
+      </p:grpSpPr>
+      <p:grpSp>
+        <p:nvGrpSpPr>
+          <p:cNvPr id="11" name="Group 10">
+            <a:extLst>
+              <a:ext uri="{FF2B5EF4-FFF2-40B4-BE49-F238E27FC236}">
+                <a16:creationId xmlns:a16="http://schemas.microsoft.com/office/drawing/2014/main" id="{F7A6FD2B-CABC-4FDA-A3A6-C4157157EF93}"/>
+              </a:ext>
+            </a:extLst>
+          </p:cNvPr>
+          <p:cNvGrpSpPr/>
+          <p:nvPr/>
+        </p:nvGrpSpPr>
+        <p:grpSpPr>
+          <a:xfrm>
+            <a:off x="7599966" y="3006302"/>
+            <a:ext cx="4452830" cy="3851698"/>
+            <a:chOff x="7599966" y="3006302"/>
+            <a:chExt cx="4452830" cy="3851698"/>
+          </a:xfrm>
+        </p:grpSpPr>
+        <p:pic>
+          <p:nvPicPr>
+            <p:cNvPr id="7" name="Picture 6" descr="A picture containing clothing, holding&#10;&#10;Description automatically generated">
+              <a:extLst>
+                <a:ext uri="{FF2B5EF4-FFF2-40B4-BE49-F238E27FC236}">
+                  <a16:creationId xmlns:a16="http://schemas.microsoft.com/office/drawing/2014/main" id="{6794E1C2-97C1-4BB4-B075-1F13439ABD34}"/>
+                </a:ext>
+              </a:extLst>
+            </p:cNvPr>
+            <p:cNvPicPr>
+              <a:picLocks noChangeAspect="1"/>
+            </p:cNvPicPr>
+            <p:nvPr/>
+          </p:nvPicPr>
+          <p:blipFill>
+            <a:blip r:embed="rId2">
+              <a:extLst>
+                <a:ext uri="{28A0092B-C50C-407E-A947-70E740481C1C}">
+                  <a14:useLocalDpi xmlns:a14="http://schemas.microsoft.com/office/drawing/2010/main" val="0"/>
+                </a:ext>
+              </a:extLst>
+            </a:blip>
+            <a:stretch>
+              <a:fillRect/>
+            </a:stretch>
+          </p:blipFill>
+          <p:spPr>
+            <a:xfrm>
+              <a:off x="7599966" y="3006302"/>
+              <a:ext cx="4452830" cy="3851698"/>
+            </a:xfrm>
+            <a:prstGeom prst="rect">
+              <a:avLst/>
+            </a:prstGeom>
+          </p:spPr>
+        </p:pic>
+        <p:sp>
+          <p:nvSpPr>
+            <p:cNvPr id="8" name="Hexagon 7">
+              <a:extLst>
+                <a:ext uri="{FF2B5EF4-FFF2-40B4-BE49-F238E27FC236}">
+                  <a16:creationId xmlns:a16="http://schemas.microsoft.com/office/drawing/2014/main" id="{24575FE9-2970-4439-B52B-5B4C77E954D4}"/>
+                </a:ext>
+              </a:extLst>
+            </p:cNvPr>
+            <p:cNvSpPr/>
+            <p:nvPr/>
+          </p:nvSpPr>
+          <p:spPr>
+            <a:xfrm rot="5400000">
+              <a:off x="9056440" y="4195683"/>
+              <a:ext cx="1521735" cy="1311841"/>
+            </a:xfrm>
+            <a:prstGeom prst="hexagon">
+              <a:avLst/>
+            </a:prstGeom>
+          </p:spPr>
+          <p:style>
+            <a:lnRef idx="2">
+              <a:schemeClr val="dk1">
+                <a:shade val="50000"/>
+              </a:schemeClr>
+            </a:lnRef>
+            <a:fillRef idx="1">
+              <a:schemeClr val="dk1"/>
+            </a:fillRef>
+            <a:effectRef idx="0">
+              <a:schemeClr val="dk1"/>
+            </a:effectRef>
+            <a:fontRef idx="minor">
+              <a:schemeClr val="lt1"/>
+            </a:fontRef>
+          </p:style>
+          <p:txBody>
+            <a:bodyPr rtlCol="0" anchor="ctr"/>
+            <a:lstStyle/>
+            <a:p>
+              <a:pPr algn="ctr"/>
+              <a:endParaRPr lang="pt-BR" dirty="0"/>
+            </a:p>
+          </p:txBody>
+        </p:sp>
+        <p:sp>
+          <p:nvSpPr>
+            <p:cNvPr id="9" name="TextBox 8">
+              <a:extLst>
+                <a:ext uri="{FF2B5EF4-FFF2-40B4-BE49-F238E27FC236}">
+                  <a16:creationId xmlns:a16="http://schemas.microsoft.com/office/drawing/2014/main" id="{115DDE84-D09E-44AC-A701-31074745158F}"/>
+                </a:ext>
+              </a:extLst>
+            </p:cNvPr>
+            <p:cNvSpPr txBox="1"/>
+            <p:nvPr/>
+          </p:nvSpPr>
+          <p:spPr>
+            <a:xfrm>
+              <a:off x="9556114" y="4343771"/>
+              <a:ext cx="540533" cy="1015663"/>
+            </a:xfrm>
+            <a:prstGeom prst="rect">
+              <a:avLst/>
+            </a:prstGeom>
+            <a:noFill/>
+          </p:spPr>
+          <p:txBody>
+            <a:bodyPr wrap="none" rtlCol="0">
+              <a:spAutoFit/>
+            </a:bodyPr>
+            <a:lstStyle/>
+            <a:p>
+              <a:r>
+                <a:rPr lang="pt-BR" sz="6000" dirty="0">
+                  <a:solidFill>
+                    <a:schemeClr val="bg1"/>
+                  </a:solidFill>
+                </a:rPr>
+                <a:t>?</a:t>
+              </a:r>
+            </a:p>
+          </p:txBody>
+        </p:sp>
+      </p:grpSp>
+      <p:pic>
+        <p:nvPicPr>
+          <p:cNvPr id="6" name="Picture 5" descr="A close up of a sign&#10;&#10;Description automatically generated">
+            <a:hlinkClick r:id="rId3"/>
+            <a:extLst>
+              <a:ext uri="{FF2B5EF4-FFF2-40B4-BE49-F238E27FC236}">
+                <a16:creationId xmlns:a16="http://schemas.microsoft.com/office/drawing/2014/main" id="{6BE1DCE9-2C5F-40E2-8FB3-AD07CEFFDA34}"/>
+              </a:ext>
+            </a:extLst>
+          </p:cNvPr>
+          <p:cNvPicPr>
+            <a:picLocks noChangeAspect="1"/>
+          </p:cNvPicPr>
+          <p:nvPr/>
+        </p:nvPicPr>
+        <p:blipFill>
+          <a:blip r:embed="rId4">
+            <a:extLst>
+              <a:ext uri="{28A0092B-C50C-407E-A947-70E740481C1C}">
+                <a14:useLocalDpi xmlns:a14="http://schemas.microsoft.com/office/drawing/2010/main" val="0"/>
+              </a:ext>
+            </a:extLst>
+          </a:blip>
+          <a:stretch>
+            <a:fillRect/>
+          </a:stretch>
+        </p:blipFill>
+        <p:spPr>
+          <a:xfrm>
+            <a:off x="9094649" y="4014523"/>
+            <a:ext cx="1445315" cy="1674157"/>
+          </a:xfrm>
+          <a:prstGeom prst="rect">
+            <a:avLst/>
+          </a:prstGeom>
+        </p:spPr>
+      </p:pic>
+      <p:pic>
+        <p:nvPicPr>
+          <p:cNvPr id="13" name="Picture 12" descr="A picture containing black, drawing&#10;&#10;Description automatically generated">
+            <a:hlinkClick r:id="rId3"/>
+            <a:extLst>
+              <a:ext uri="{FF2B5EF4-FFF2-40B4-BE49-F238E27FC236}">
+                <a16:creationId xmlns:a16="http://schemas.microsoft.com/office/drawing/2014/main" id="{8DC45BFF-E8C4-49BE-956A-563D69C3E682}"/>
+              </a:ext>
+            </a:extLst>
+          </p:cNvPr>
+          <p:cNvPicPr>
+            <a:picLocks noChangeAspect="1"/>
+          </p:cNvPicPr>
+          <p:nvPr/>
+        </p:nvPicPr>
+        <p:blipFill>
+          <a:blip r:embed="rId5">
+            <a:extLst>
+              <a:ext uri="{28A0092B-C50C-407E-A947-70E740481C1C}">
+                <a14:useLocalDpi xmlns:a14="http://schemas.microsoft.com/office/drawing/2010/main" val="0"/>
+              </a:ext>
+            </a:extLst>
+          </a:blip>
+          <a:stretch>
+            <a:fillRect/>
+          </a:stretch>
+        </p:blipFill>
+        <p:spPr>
+          <a:xfrm>
+            <a:off x="8398454" y="415210"/>
+            <a:ext cx="2882693" cy="2882693"/>
+          </a:xfrm>
+          <a:prstGeom prst="rect">
+            <a:avLst/>
+          </a:prstGeom>
+        </p:spPr>
+      </p:pic>
+      <p:pic>
+        <p:nvPicPr>
+          <p:cNvPr id="15" name="Picture 14" descr="A close up of a logo&#10;&#10;Description automatically generated">
+            <a:extLst>
+              <a:ext uri="{FF2B5EF4-FFF2-40B4-BE49-F238E27FC236}">
+                <a16:creationId xmlns:a16="http://schemas.microsoft.com/office/drawing/2014/main" id="{FB9A0515-6887-45F8-8420-5DE11D3769F5}"/>
+              </a:ext>
+            </a:extLst>
+          </p:cNvPr>
+          <p:cNvPicPr>
+            <a:picLocks noChangeAspect="1"/>
+          </p:cNvPicPr>
+          <p:nvPr/>
+        </p:nvPicPr>
+        <p:blipFill>
+          <a:blip r:embed="rId6">
+            <a:extLst>
+              <a:ext uri="{28A0092B-C50C-407E-A947-70E740481C1C}">
+                <a14:useLocalDpi xmlns:a14="http://schemas.microsoft.com/office/drawing/2010/main" val="0"/>
+              </a:ext>
+            </a:extLst>
+          </a:blip>
+          <a:stretch>
+            <a:fillRect/>
+          </a:stretch>
+        </p:blipFill>
+        <p:spPr>
+          <a:xfrm rot="14117707">
+            <a:off x="10289010" y="3475443"/>
+            <a:ext cx="1470605" cy="1483619"/>
+          </a:xfrm>
+          <a:prstGeom prst="rect">
+            <a:avLst/>
+          </a:prstGeom>
+        </p:spPr>
+      </p:pic>
+      <p:pic>
+        <p:nvPicPr>
+          <p:cNvPr id="3" name="Picture 2">
+            <a:extLst>
+              <a:ext uri="{FF2B5EF4-FFF2-40B4-BE49-F238E27FC236}">
+                <a16:creationId xmlns:a16="http://schemas.microsoft.com/office/drawing/2014/main" id="{B5352E59-256E-4AA9-AC34-A84B244FF5BD}"/>
+              </a:ext>
+            </a:extLst>
+          </p:cNvPr>
+          <p:cNvPicPr>
+            <a:picLocks noChangeAspect="1"/>
+          </p:cNvPicPr>
+          <p:nvPr/>
+        </p:nvPicPr>
+        <p:blipFill>
+          <a:blip r:embed="rId7"/>
+          <a:stretch>
+            <a:fillRect/>
+          </a:stretch>
+        </p:blipFill>
+        <p:spPr>
+          <a:xfrm>
+            <a:off x="0" y="0"/>
+            <a:ext cx="7042180" cy="6858000"/>
+          </a:xfrm>
+          <a:prstGeom prst="rect">
+            <a:avLst/>
+          </a:prstGeom>
+        </p:spPr>
+      </p:pic>
+    </p:spTree>
+    <p:extLst>
+      <p:ext uri="{BB962C8B-B14F-4D97-AF65-F5344CB8AC3E}">
+        <p14:creationId xmlns:p14="http://schemas.microsoft.com/office/powerpoint/2010/main" val="250383152"/>
+      </p:ext>
+    </p:extLst>
+  </p:cSld>
+  <p:clrMapOvr>
+    <a:masterClrMapping/>
+  </p:clrMapOvr>
+</p:sld>
+</file>
+
+<file path=ppt/slides/slide4.xml><?xml version="1.0" encoding="utf-8"?>
+<p:sld xmlns:a="http://schemas.openxmlformats.org/drawingml/2006/main" xmlns:r="http://schemas.openxmlformats.org/officeDocument/2006/relationships" xmlns:p="http://schemas.openxmlformats.org/presentationml/2006/main">
+  <p:cSld>
+    <p:spTree>
+      <p:nvGrpSpPr>
+        <p:cNvPr id="1" name=""/>
+        <p:cNvGrpSpPr/>
+        <p:nvPr/>
+      </p:nvGrpSpPr>
+      <p:grpSpPr>
+        <a:xfrm>
+          <a:off x="0" y="0"/>
+          <a:ext cx="0" cy="0"/>
+          <a:chOff x="0" y="0"/>
+          <a:chExt cx="0" cy="0"/>
+        </a:xfrm>
+      </p:grpSpPr>
+      <p:grpSp>
+        <p:nvGrpSpPr>
+          <p:cNvPr id="11" name="Group 10">
+            <a:extLst>
+              <a:ext uri="{FF2B5EF4-FFF2-40B4-BE49-F238E27FC236}">
+                <a16:creationId xmlns:a16="http://schemas.microsoft.com/office/drawing/2014/main" id="{F7A6FD2B-CABC-4FDA-A3A6-C4157157EF93}"/>
+              </a:ext>
+            </a:extLst>
+          </p:cNvPr>
+          <p:cNvGrpSpPr/>
+          <p:nvPr/>
+        </p:nvGrpSpPr>
+        <p:grpSpPr>
+          <a:xfrm>
+            <a:off x="7599966" y="3006302"/>
+            <a:ext cx="4452830" cy="3851698"/>
+            <a:chOff x="7599966" y="3006302"/>
+            <a:chExt cx="4452830" cy="3851698"/>
+          </a:xfrm>
+        </p:grpSpPr>
+        <p:pic>
+          <p:nvPicPr>
+            <p:cNvPr id="7" name="Picture 6" descr="A picture containing clothing, holding&#10;&#10;Description automatically generated">
+              <a:extLst>
+                <a:ext uri="{FF2B5EF4-FFF2-40B4-BE49-F238E27FC236}">
+                  <a16:creationId xmlns:a16="http://schemas.microsoft.com/office/drawing/2014/main" id="{6794E1C2-97C1-4BB4-B075-1F13439ABD34}"/>
+                </a:ext>
+              </a:extLst>
+            </p:cNvPr>
+            <p:cNvPicPr>
+              <a:picLocks noChangeAspect="1"/>
+            </p:cNvPicPr>
+            <p:nvPr/>
+          </p:nvPicPr>
+          <p:blipFill>
+            <a:blip r:embed="rId2">
+              <a:extLst>
+                <a:ext uri="{28A0092B-C50C-407E-A947-70E740481C1C}">
+                  <a14:useLocalDpi xmlns:a14="http://schemas.microsoft.com/office/drawing/2010/main" val="0"/>
+                </a:ext>
+              </a:extLst>
+            </a:blip>
+            <a:stretch>
+              <a:fillRect/>
+            </a:stretch>
+          </p:blipFill>
+          <p:spPr>
+            <a:xfrm>
+              <a:off x="7599966" y="3006302"/>
+              <a:ext cx="4452830" cy="3851698"/>
+            </a:xfrm>
+            <a:prstGeom prst="rect">
+              <a:avLst/>
+            </a:prstGeom>
+          </p:spPr>
+        </p:pic>
+        <p:sp>
+          <p:nvSpPr>
+            <p:cNvPr id="8" name="Hexagon 7">
+              <a:extLst>
+                <a:ext uri="{FF2B5EF4-FFF2-40B4-BE49-F238E27FC236}">
+                  <a16:creationId xmlns:a16="http://schemas.microsoft.com/office/drawing/2014/main" id="{24575FE9-2970-4439-B52B-5B4C77E954D4}"/>
+                </a:ext>
+              </a:extLst>
+            </p:cNvPr>
+            <p:cNvSpPr/>
+            <p:nvPr/>
+          </p:nvSpPr>
+          <p:spPr>
+            <a:xfrm rot="5400000">
+              <a:off x="9056440" y="4195683"/>
+              <a:ext cx="1521735" cy="1311841"/>
+            </a:xfrm>
+            <a:prstGeom prst="hexagon">
+              <a:avLst/>
+            </a:prstGeom>
+          </p:spPr>
+          <p:style>
+            <a:lnRef idx="2">
+              <a:schemeClr val="dk1">
+                <a:shade val="50000"/>
+              </a:schemeClr>
+            </a:lnRef>
+            <a:fillRef idx="1">
+              <a:schemeClr val="dk1"/>
+            </a:fillRef>
+            <a:effectRef idx="0">
+              <a:schemeClr val="dk1"/>
+            </a:effectRef>
+            <a:fontRef idx="minor">
+              <a:schemeClr val="lt1"/>
+            </a:fontRef>
+          </p:style>
+          <p:txBody>
+            <a:bodyPr rtlCol="0" anchor="ctr"/>
+            <a:lstStyle/>
+            <a:p>
+              <a:pPr algn="ctr"/>
+              <a:endParaRPr lang="pt-BR" dirty="0"/>
+            </a:p>
+          </p:txBody>
+        </p:sp>
+        <p:sp>
+          <p:nvSpPr>
+            <p:cNvPr id="9" name="TextBox 8">
+              <a:extLst>
+                <a:ext uri="{FF2B5EF4-FFF2-40B4-BE49-F238E27FC236}">
+                  <a16:creationId xmlns:a16="http://schemas.microsoft.com/office/drawing/2014/main" id="{115DDE84-D09E-44AC-A701-31074745158F}"/>
+                </a:ext>
+              </a:extLst>
+            </p:cNvPr>
+            <p:cNvSpPr txBox="1"/>
+            <p:nvPr/>
+          </p:nvSpPr>
+          <p:spPr>
+            <a:xfrm>
+              <a:off x="9556114" y="4343771"/>
+              <a:ext cx="540533" cy="1015663"/>
+            </a:xfrm>
+            <a:prstGeom prst="rect">
+              <a:avLst/>
+            </a:prstGeom>
+            <a:noFill/>
+          </p:spPr>
+          <p:txBody>
+            <a:bodyPr wrap="none" rtlCol="0">
+              <a:spAutoFit/>
+            </a:bodyPr>
+            <a:lstStyle/>
+            <a:p>
+              <a:r>
+                <a:rPr lang="pt-BR" sz="6000" dirty="0">
+                  <a:solidFill>
+                    <a:schemeClr val="bg1"/>
+                  </a:solidFill>
+                </a:rPr>
+                <a:t>?</a:t>
+              </a:r>
+            </a:p>
+          </p:txBody>
+        </p:sp>
+      </p:grpSp>
+      <p:pic>
+        <p:nvPicPr>
+          <p:cNvPr id="6" name="Picture 5" descr="A close up of a sign&#10;&#10;Description automatically generated">
+            <a:hlinkClick r:id="rId3"/>
+            <a:extLst>
+              <a:ext uri="{FF2B5EF4-FFF2-40B4-BE49-F238E27FC236}">
+                <a16:creationId xmlns:a16="http://schemas.microsoft.com/office/drawing/2014/main" id="{6BE1DCE9-2C5F-40E2-8FB3-AD07CEFFDA34}"/>
+              </a:ext>
+            </a:extLst>
+          </p:cNvPr>
+          <p:cNvPicPr>
+            <a:picLocks noChangeAspect="1"/>
+          </p:cNvPicPr>
+          <p:nvPr/>
+        </p:nvPicPr>
+        <p:blipFill>
+          <a:blip r:embed="rId4">
+            <a:extLst>
+              <a:ext uri="{28A0092B-C50C-407E-A947-70E740481C1C}">
+                <a14:useLocalDpi xmlns:a14="http://schemas.microsoft.com/office/drawing/2010/main" val="0"/>
+              </a:ext>
+            </a:extLst>
+          </a:blip>
+          <a:stretch>
+            <a:fillRect/>
+          </a:stretch>
+        </p:blipFill>
+        <p:spPr>
+          <a:xfrm>
+            <a:off x="9094649" y="4014523"/>
+            <a:ext cx="1445315" cy="1674157"/>
+          </a:xfrm>
+          <a:prstGeom prst="rect">
+            <a:avLst/>
+          </a:prstGeom>
+        </p:spPr>
+      </p:pic>
+      <p:pic>
+        <p:nvPicPr>
+          <p:cNvPr id="13" name="Picture 12" descr="A picture containing black, drawing&#10;&#10;Description automatically generated">
+            <a:hlinkClick r:id="rId3"/>
+            <a:extLst>
+              <a:ext uri="{FF2B5EF4-FFF2-40B4-BE49-F238E27FC236}">
+                <a16:creationId xmlns:a16="http://schemas.microsoft.com/office/drawing/2014/main" id="{8DC45BFF-E8C4-49BE-956A-563D69C3E682}"/>
+              </a:ext>
+            </a:extLst>
+          </p:cNvPr>
+          <p:cNvPicPr>
+            <a:picLocks noChangeAspect="1"/>
+          </p:cNvPicPr>
+          <p:nvPr/>
+        </p:nvPicPr>
+        <p:blipFill>
+          <a:blip r:embed="rId5">
+            <a:extLst>
+              <a:ext uri="{28A0092B-C50C-407E-A947-70E740481C1C}">
+                <a14:useLocalDpi xmlns:a14="http://schemas.microsoft.com/office/drawing/2010/main" val="0"/>
+              </a:ext>
+            </a:extLst>
+          </a:blip>
+          <a:stretch>
+            <a:fillRect/>
+          </a:stretch>
+        </p:blipFill>
+        <p:spPr>
+          <a:xfrm>
+            <a:off x="8398454" y="415210"/>
+            <a:ext cx="2882693" cy="2882693"/>
+          </a:xfrm>
+          <a:prstGeom prst="rect">
+            <a:avLst/>
+          </a:prstGeom>
+        </p:spPr>
+      </p:pic>
+      <p:pic>
+        <p:nvPicPr>
+          <p:cNvPr id="15" name="Picture 14" descr="A close up of a logo&#10;&#10;Description automatically generated">
+            <a:extLst>
+              <a:ext uri="{FF2B5EF4-FFF2-40B4-BE49-F238E27FC236}">
+                <a16:creationId xmlns:a16="http://schemas.microsoft.com/office/drawing/2014/main" id="{FB9A0515-6887-45F8-8420-5DE11D3769F5}"/>
+              </a:ext>
+            </a:extLst>
+          </p:cNvPr>
+          <p:cNvPicPr>
+            <a:picLocks noChangeAspect="1"/>
+          </p:cNvPicPr>
+          <p:nvPr/>
+        </p:nvPicPr>
+        <p:blipFill>
+          <a:blip r:embed="rId6">
+            <a:extLst>
+              <a:ext uri="{28A0092B-C50C-407E-A947-70E740481C1C}">
+                <a14:useLocalDpi xmlns:a14="http://schemas.microsoft.com/office/drawing/2010/main" val="0"/>
+              </a:ext>
+            </a:extLst>
+          </a:blip>
+          <a:stretch>
+            <a:fillRect/>
+          </a:stretch>
+        </p:blipFill>
+        <p:spPr>
+          <a:xfrm rot="14117707">
+            <a:off x="10289010" y="3475443"/>
+            <a:ext cx="1470605" cy="1483619"/>
+          </a:xfrm>
+          <a:prstGeom prst="rect">
+            <a:avLst/>
+          </a:prstGeom>
+        </p:spPr>
+      </p:pic>
+      <p:pic>
+        <p:nvPicPr>
+          <p:cNvPr id="3" name="Picture 2">
+            <a:extLst>
+              <a:ext uri="{FF2B5EF4-FFF2-40B4-BE49-F238E27FC236}">
+                <a16:creationId xmlns:a16="http://schemas.microsoft.com/office/drawing/2014/main" id="{151A9117-8A9E-4D68-99C2-51B33B5800C0}"/>
+              </a:ext>
+            </a:extLst>
+          </p:cNvPr>
+          <p:cNvPicPr>
+            <a:picLocks noChangeAspect="1"/>
+          </p:cNvPicPr>
+          <p:nvPr/>
+        </p:nvPicPr>
+        <p:blipFill>
+          <a:blip r:embed="rId7"/>
+          <a:stretch>
+            <a:fillRect/>
+          </a:stretch>
+        </p:blipFill>
+        <p:spPr>
+          <a:xfrm>
+            <a:off x="0" y="0"/>
+            <a:ext cx="7880799" cy="6858000"/>
+          </a:xfrm>
+          <a:prstGeom prst="rect">
+            <a:avLst/>
+          </a:prstGeom>
+        </p:spPr>
+      </p:pic>
+    </p:spTree>
+    <p:extLst>
+      <p:ext uri="{BB962C8B-B14F-4D97-AF65-F5344CB8AC3E}">
+        <p14:creationId xmlns:p14="http://schemas.microsoft.com/office/powerpoint/2010/main" val="3264877671"/>
+      </p:ext>
+    </p:extLst>
+  </p:cSld>
+  <p:clrMapOvr>
+    <a:masterClrMapping/>
+  </p:clrMapOvr>
+</p:sld>
+</file>
+
+<file path=ppt/slides/slide5.xml><?xml version="1.0" encoding="utf-8"?>
+<p:sld xmlns:a="http://schemas.openxmlformats.org/drawingml/2006/main" xmlns:r="http://schemas.openxmlformats.org/officeDocument/2006/relationships" xmlns:p="http://schemas.openxmlformats.org/presentationml/2006/main">
+  <p:cSld>
+    <p:spTree>
+      <p:nvGrpSpPr>
+        <p:cNvPr id="1" name=""/>
+        <p:cNvGrpSpPr/>
+        <p:nvPr/>
+      </p:nvGrpSpPr>
+      <p:grpSpPr>
+        <a:xfrm>
+          <a:off x="0" y="0"/>
+          <a:ext cx="0" cy="0"/>
+          <a:chOff x="0" y="0"/>
+          <a:chExt cx="0" cy="0"/>
+        </a:xfrm>
+      </p:grpSpPr>
+      <p:grpSp>
+        <p:nvGrpSpPr>
+          <p:cNvPr id="11" name="Group 10">
+            <a:extLst>
+              <a:ext uri="{FF2B5EF4-FFF2-40B4-BE49-F238E27FC236}">
+                <a16:creationId xmlns:a16="http://schemas.microsoft.com/office/drawing/2014/main" id="{F7A6FD2B-CABC-4FDA-A3A6-C4157157EF93}"/>
+              </a:ext>
+            </a:extLst>
+          </p:cNvPr>
+          <p:cNvGrpSpPr/>
+          <p:nvPr/>
+        </p:nvGrpSpPr>
+        <p:grpSpPr>
+          <a:xfrm>
+            <a:off x="7599966" y="3006302"/>
+            <a:ext cx="4452830" cy="3851698"/>
+            <a:chOff x="7599966" y="3006302"/>
+            <a:chExt cx="4452830" cy="3851698"/>
+          </a:xfrm>
+        </p:grpSpPr>
+        <p:pic>
+          <p:nvPicPr>
+            <p:cNvPr id="7" name="Picture 6" descr="A picture containing clothing, holding&#10;&#10;Description automatically generated">
+              <a:extLst>
+                <a:ext uri="{FF2B5EF4-FFF2-40B4-BE49-F238E27FC236}">
+                  <a16:creationId xmlns:a16="http://schemas.microsoft.com/office/drawing/2014/main" id="{6794E1C2-97C1-4BB4-B075-1F13439ABD34}"/>
+                </a:ext>
+              </a:extLst>
+            </p:cNvPr>
+            <p:cNvPicPr>
+              <a:picLocks noChangeAspect="1"/>
+            </p:cNvPicPr>
+            <p:nvPr/>
+          </p:nvPicPr>
+          <p:blipFill>
+            <a:blip r:embed="rId2">
+              <a:extLst>
+                <a:ext uri="{28A0092B-C50C-407E-A947-70E740481C1C}">
+                  <a14:useLocalDpi xmlns:a14="http://schemas.microsoft.com/office/drawing/2010/main" val="0"/>
+                </a:ext>
+              </a:extLst>
+            </a:blip>
+            <a:stretch>
+              <a:fillRect/>
+            </a:stretch>
+          </p:blipFill>
+          <p:spPr>
+            <a:xfrm>
+              <a:off x="7599966" y="3006302"/>
+              <a:ext cx="4452830" cy="3851698"/>
+            </a:xfrm>
+            <a:prstGeom prst="rect">
+              <a:avLst/>
+            </a:prstGeom>
+          </p:spPr>
+        </p:pic>
+        <p:sp>
+          <p:nvSpPr>
+            <p:cNvPr id="8" name="Hexagon 7">
+              <a:extLst>
+                <a:ext uri="{FF2B5EF4-FFF2-40B4-BE49-F238E27FC236}">
+                  <a16:creationId xmlns:a16="http://schemas.microsoft.com/office/drawing/2014/main" id="{24575FE9-2970-4439-B52B-5B4C77E954D4}"/>
+                </a:ext>
+              </a:extLst>
+            </p:cNvPr>
+            <p:cNvSpPr/>
+            <p:nvPr/>
+          </p:nvSpPr>
+          <p:spPr>
+            <a:xfrm rot="5400000">
+              <a:off x="9056440" y="4195683"/>
+              <a:ext cx="1521735" cy="1311841"/>
+            </a:xfrm>
+            <a:prstGeom prst="hexagon">
+              <a:avLst/>
+            </a:prstGeom>
+          </p:spPr>
+          <p:style>
+            <a:lnRef idx="2">
+              <a:schemeClr val="dk1">
+                <a:shade val="50000"/>
+              </a:schemeClr>
+            </a:lnRef>
+            <a:fillRef idx="1">
+              <a:schemeClr val="dk1"/>
+            </a:fillRef>
+            <a:effectRef idx="0">
+              <a:schemeClr val="dk1"/>
+            </a:effectRef>
+            <a:fontRef idx="minor">
+              <a:schemeClr val="lt1"/>
+            </a:fontRef>
+          </p:style>
+          <p:txBody>
+            <a:bodyPr rtlCol="0" anchor="ctr"/>
+            <a:lstStyle/>
+            <a:p>
+              <a:pPr algn="ctr"/>
+              <a:endParaRPr lang="pt-BR" dirty="0"/>
+            </a:p>
+          </p:txBody>
+        </p:sp>
+        <p:sp>
+          <p:nvSpPr>
+            <p:cNvPr id="9" name="TextBox 8">
+              <a:extLst>
+                <a:ext uri="{FF2B5EF4-FFF2-40B4-BE49-F238E27FC236}">
+                  <a16:creationId xmlns:a16="http://schemas.microsoft.com/office/drawing/2014/main" id="{115DDE84-D09E-44AC-A701-31074745158F}"/>
+                </a:ext>
+              </a:extLst>
+            </p:cNvPr>
+            <p:cNvSpPr txBox="1"/>
+            <p:nvPr/>
+          </p:nvSpPr>
+          <p:spPr>
+            <a:xfrm>
+              <a:off x="9556114" y="4343771"/>
+              <a:ext cx="540533" cy="1015663"/>
+            </a:xfrm>
+            <a:prstGeom prst="rect">
+              <a:avLst/>
+            </a:prstGeom>
+            <a:noFill/>
+          </p:spPr>
+          <p:txBody>
+            <a:bodyPr wrap="none" rtlCol="0">
+              <a:spAutoFit/>
+            </a:bodyPr>
+            <a:lstStyle/>
+            <a:p>
+              <a:r>
+                <a:rPr lang="pt-BR" sz="6000" dirty="0">
+                  <a:solidFill>
+                    <a:schemeClr val="bg1"/>
+                  </a:solidFill>
+                </a:rPr>
+                <a:t>?</a:t>
+              </a:r>
+            </a:p>
+          </p:txBody>
+        </p:sp>
+      </p:grpSp>
+      <p:pic>
+        <p:nvPicPr>
+          <p:cNvPr id="6" name="Picture 5" descr="A close up of a sign&#10;&#10;Description automatically generated">
+            <a:hlinkClick r:id="rId3"/>
+            <a:extLst>
+              <a:ext uri="{FF2B5EF4-FFF2-40B4-BE49-F238E27FC236}">
+                <a16:creationId xmlns:a16="http://schemas.microsoft.com/office/drawing/2014/main" id="{6BE1DCE9-2C5F-40E2-8FB3-AD07CEFFDA34}"/>
+              </a:ext>
+            </a:extLst>
+          </p:cNvPr>
+          <p:cNvPicPr>
+            <a:picLocks noChangeAspect="1"/>
+          </p:cNvPicPr>
+          <p:nvPr/>
+        </p:nvPicPr>
+        <p:blipFill>
+          <a:blip r:embed="rId4">
+            <a:extLst>
+              <a:ext uri="{28A0092B-C50C-407E-A947-70E740481C1C}">
+                <a14:useLocalDpi xmlns:a14="http://schemas.microsoft.com/office/drawing/2010/main" val="0"/>
+              </a:ext>
+            </a:extLst>
+          </a:blip>
+          <a:stretch>
+            <a:fillRect/>
+          </a:stretch>
+        </p:blipFill>
+        <p:spPr>
+          <a:xfrm>
+            <a:off x="9094649" y="4014523"/>
+            <a:ext cx="1445315" cy="1674157"/>
+          </a:xfrm>
+          <a:prstGeom prst="rect">
+            <a:avLst/>
+          </a:prstGeom>
+        </p:spPr>
+      </p:pic>
+      <p:pic>
+        <p:nvPicPr>
+          <p:cNvPr id="13" name="Picture 12" descr="A picture containing black, drawing&#10;&#10;Description automatically generated">
+            <a:hlinkClick r:id="rId3"/>
+            <a:extLst>
+              <a:ext uri="{FF2B5EF4-FFF2-40B4-BE49-F238E27FC236}">
+                <a16:creationId xmlns:a16="http://schemas.microsoft.com/office/drawing/2014/main" id="{8DC45BFF-E8C4-49BE-956A-563D69C3E682}"/>
+              </a:ext>
+            </a:extLst>
+          </p:cNvPr>
+          <p:cNvPicPr>
+            <a:picLocks noChangeAspect="1"/>
+          </p:cNvPicPr>
+          <p:nvPr/>
+        </p:nvPicPr>
+        <p:blipFill>
+          <a:blip r:embed="rId5">
+            <a:extLst>
+              <a:ext uri="{28A0092B-C50C-407E-A947-70E740481C1C}">
+                <a14:useLocalDpi xmlns:a14="http://schemas.microsoft.com/office/drawing/2010/main" val="0"/>
+              </a:ext>
+            </a:extLst>
+          </a:blip>
+          <a:stretch>
+            <a:fillRect/>
+          </a:stretch>
+        </p:blipFill>
+        <p:spPr>
+          <a:xfrm>
+            <a:off x="8398454" y="415210"/>
+            <a:ext cx="2882693" cy="2882693"/>
+          </a:xfrm>
+          <a:prstGeom prst="rect">
+            <a:avLst/>
+          </a:prstGeom>
+        </p:spPr>
+      </p:pic>
+      <p:pic>
+        <p:nvPicPr>
+          <p:cNvPr id="15" name="Picture 14" descr="A close up of a logo&#10;&#10;Description automatically generated">
+            <a:extLst>
+              <a:ext uri="{FF2B5EF4-FFF2-40B4-BE49-F238E27FC236}">
+                <a16:creationId xmlns:a16="http://schemas.microsoft.com/office/drawing/2014/main" id="{FB9A0515-6887-45F8-8420-5DE11D3769F5}"/>
+              </a:ext>
+            </a:extLst>
+          </p:cNvPr>
+          <p:cNvPicPr>
+            <a:picLocks noChangeAspect="1"/>
+          </p:cNvPicPr>
+          <p:nvPr/>
+        </p:nvPicPr>
+        <p:blipFill>
+          <a:blip r:embed="rId6">
+            <a:extLst>
+              <a:ext uri="{28A0092B-C50C-407E-A947-70E740481C1C}">
+                <a14:useLocalDpi xmlns:a14="http://schemas.microsoft.com/office/drawing/2010/main" val="0"/>
+              </a:ext>
+            </a:extLst>
+          </a:blip>
+          <a:stretch>
+            <a:fillRect/>
+          </a:stretch>
+        </p:blipFill>
+        <p:spPr>
+          <a:xfrm rot="14117707">
+            <a:off x="10289010" y="3475443"/>
+            <a:ext cx="1470605" cy="1483619"/>
+          </a:xfrm>
+          <a:prstGeom prst="rect">
+            <a:avLst/>
+          </a:prstGeom>
+        </p:spPr>
+      </p:pic>
+      <p:pic>
+        <p:nvPicPr>
+          <p:cNvPr id="2" name="Picture 1">
+            <a:extLst>
+              <a:ext uri="{FF2B5EF4-FFF2-40B4-BE49-F238E27FC236}">
+                <a16:creationId xmlns:a16="http://schemas.microsoft.com/office/drawing/2014/main" id="{DF707C3C-4E56-469F-B3E6-6FD7F68DDBEE}"/>
+              </a:ext>
+            </a:extLst>
+          </p:cNvPr>
+          <p:cNvPicPr>
+            <a:picLocks noChangeAspect="1"/>
+          </p:cNvPicPr>
+          <p:nvPr/>
+        </p:nvPicPr>
+        <p:blipFill>
+          <a:blip r:embed="rId7"/>
+          <a:stretch>
+            <a:fillRect/>
+          </a:stretch>
+        </p:blipFill>
+        <p:spPr>
+          <a:xfrm>
+            <a:off x="0" y="0"/>
+            <a:ext cx="7880799" cy="6858000"/>
+          </a:xfrm>
+          <a:prstGeom prst="rect">
+            <a:avLst/>
+          </a:prstGeom>
+        </p:spPr>
+      </p:pic>
+    </p:spTree>
+    <p:extLst>
+      <p:ext uri="{BB962C8B-B14F-4D97-AF65-F5344CB8AC3E}">
+        <p14:creationId xmlns:p14="http://schemas.microsoft.com/office/powerpoint/2010/main" val="3497920034"/>
+      </p:ext>
+    </p:extLst>
+  </p:cSld>
+  <p:clrMapOvr>
+    <a:masterClrMapping/>
+  </p:clrMapOvr>
+</p:sld>
+</file>
+
+<file path=ppt/slides/slide6.xml><?xml version="1.0" encoding="utf-8"?>
+<p:sld xmlns:a="http://schemas.openxmlformats.org/drawingml/2006/main" xmlns:r="http://schemas.openxmlformats.org/officeDocument/2006/relationships" xmlns:p="http://schemas.openxmlformats.org/presentationml/2006/main">
+  <p:cSld>
+    <p:spTree>
+      <p:nvGrpSpPr>
+        <p:cNvPr id="1" name=""/>
+        <p:cNvGrpSpPr/>
+        <p:nvPr/>
+      </p:nvGrpSpPr>
+      <p:grpSpPr>
+        <a:xfrm>
+          <a:off x="0" y="0"/>
+          <a:ext cx="0" cy="0"/>
+          <a:chOff x="0" y="0"/>
+          <a:chExt cx="0" cy="0"/>
+        </a:xfrm>
+      </p:grpSpPr>
+      <p:grpSp>
+        <p:nvGrpSpPr>
+          <p:cNvPr id="11" name="Group 10">
+            <a:extLst>
+              <a:ext uri="{FF2B5EF4-FFF2-40B4-BE49-F238E27FC236}">
+                <a16:creationId xmlns:a16="http://schemas.microsoft.com/office/drawing/2014/main" id="{F7A6FD2B-CABC-4FDA-A3A6-C4157157EF93}"/>
+              </a:ext>
+            </a:extLst>
+          </p:cNvPr>
+          <p:cNvGrpSpPr/>
+          <p:nvPr/>
+        </p:nvGrpSpPr>
+        <p:grpSpPr>
+          <a:xfrm>
+            <a:off x="7599966" y="3006302"/>
+            <a:ext cx="4452830" cy="3851698"/>
+            <a:chOff x="7599966" y="3006302"/>
+            <a:chExt cx="4452830" cy="3851698"/>
+          </a:xfrm>
+        </p:grpSpPr>
+        <p:pic>
+          <p:nvPicPr>
+            <p:cNvPr id="7" name="Picture 6" descr="A picture containing clothing, holding&#10;&#10;Description automatically generated">
+              <a:extLst>
+                <a:ext uri="{FF2B5EF4-FFF2-40B4-BE49-F238E27FC236}">
+                  <a16:creationId xmlns:a16="http://schemas.microsoft.com/office/drawing/2014/main" id="{6794E1C2-97C1-4BB4-B075-1F13439ABD34}"/>
+                </a:ext>
+              </a:extLst>
+            </p:cNvPr>
+            <p:cNvPicPr>
+              <a:picLocks noChangeAspect="1"/>
+            </p:cNvPicPr>
+            <p:nvPr/>
+          </p:nvPicPr>
+          <p:blipFill>
+            <a:blip r:embed="rId2">
+              <a:extLst>
+                <a:ext uri="{28A0092B-C50C-407E-A947-70E740481C1C}">
+                  <a14:useLocalDpi xmlns:a14="http://schemas.microsoft.com/office/drawing/2010/main" val="0"/>
+                </a:ext>
+              </a:extLst>
+            </a:blip>
+            <a:stretch>
+              <a:fillRect/>
+            </a:stretch>
+          </p:blipFill>
+          <p:spPr>
+            <a:xfrm>
+              <a:off x="7599966" y="3006302"/>
+              <a:ext cx="4452830" cy="3851698"/>
+            </a:xfrm>
+            <a:prstGeom prst="rect">
+              <a:avLst/>
+            </a:prstGeom>
+          </p:spPr>
+        </p:pic>
+        <p:sp>
+          <p:nvSpPr>
+            <p:cNvPr id="8" name="Hexagon 7">
+              <a:extLst>
+                <a:ext uri="{FF2B5EF4-FFF2-40B4-BE49-F238E27FC236}">
+                  <a16:creationId xmlns:a16="http://schemas.microsoft.com/office/drawing/2014/main" id="{24575FE9-2970-4439-B52B-5B4C77E954D4}"/>
+                </a:ext>
+              </a:extLst>
+            </p:cNvPr>
+            <p:cNvSpPr/>
+            <p:nvPr/>
+          </p:nvSpPr>
+          <p:spPr>
+            <a:xfrm rot="5400000">
+              <a:off x="9056440" y="4195683"/>
+              <a:ext cx="1521735" cy="1311841"/>
+            </a:xfrm>
+            <a:prstGeom prst="hexagon">
+              <a:avLst/>
+            </a:prstGeom>
+          </p:spPr>
+          <p:style>
+            <a:lnRef idx="2">
+              <a:schemeClr val="dk1">
+                <a:shade val="50000"/>
+              </a:schemeClr>
+            </a:lnRef>
+            <a:fillRef idx="1">
+              <a:schemeClr val="dk1"/>
+            </a:fillRef>
+            <a:effectRef idx="0">
+              <a:schemeClr val="dk1"/>
+            </a:effectRef>
+            <a:fontRef idx="minor">
+              <a:schemeClr val="lt1"/>
+            </a:fontRef>
+          </p:style>
+          <p:txBody>
+            <a:bodyPr rtlCol="0" anchor="ctr"/>
+            <a:lstStyle/>
+            <a:p>
+              <a:pPr algn="ctr"/>
+              <a:endParaRPr lang="pt-BR" dirty="0"/>
+            </a:p>
+          </p:txBody>
+        </p:sp>
+        <p:sp>
+          <p:nvSpPr>
+            <p:cNvPr id="9" name="TextBox 8">
+              <a:extLst>
+                <a:ext uri="{FF2B5EF4-FFF2-40B4-BE49-F238E27FC236}">
+                  <a16:creationId xmlns:a16="http://schemas.microsoft.com/office/drawing/2014/main" id="{115DDE84-D09E-44AC-A701-31074745158F}"/>
+                </a:ext>
+              </a:extLst>
+            </p:cNvPr>
+            <p:cNvSpPr txBox="1"/>
+            <p:nvPr/>
+          </p:nvSpPr>
+          <p:spPr>
+            <a:xfrm>
+              <a:off x="9556114" y="4343771"/>
+              <a:ext cx="540533" cy="1015663"/>
+            </a:xfrm>
+            <a:prstGeom prst="rect">
+              <a:avLst/>
+            </a:prstGeom>
+            <a:noFill/>
+          </p:spPr>
+          <p:txBody>
+            <a:bodyPr wrap="none" rtlCol="0">
+              <a:spAutoFit/>
+            </a:bodyPr>
+            <a:lstStyle/>
+            <a:p>
+              <a:r>
+                <a:rPr lang="pt-BR" sz="6000" dirty="0">
+                  <a:solidFill>
+                    <a:schemeClr val="bg1"/>
+                  </a:solidFill>
+                </a:rPr>
+                <a:t>?</a:t>
+              </a:r>
+            </a:p>
+          </p:txBody>
+        </p:sp>
+      </p:grpSp>
+      <p:pic>
+        <p:nvPicPr>
+          <p:cNvPr id="6" name="Picture 5" descr="A close up of a sign&#10;&#10;Description automatically generated">
+            <a:hlinkClick r:id="rId3"/>
+            <a:extLst>
+              <a:ext uri="{FF2B5EF4-FFF2-40B4-BE49-F238E27FC236}">
+                <a16:creationId xmlns:a16="http://schemas.microsoft.com/office/drawing/2014/main" id="{6BE1DCE9-2C5F-40E2-8FB3-AD07CEFFDA34}"/>
+              </a:ext>
+            </a:extLst>
+          </p:cNvPr>
+          <p:cNvPicPr>
+            <a:picLocks noChangeAspect="1"/>
+          </p:cNvPicPr>
+          <p:nvPr/>
+        </p:nvPicPr>
+        <p:blipFill>
+          <a:blip r:embed="rId4">
+            <a:extLst>
+              <a:ext uri="{28A0092B-C50C-407E-A947-70E740481C1C}">
+                <a14:useLocalDpi xmlns:a14="http://schemas.microsoft.com/office/drawing/2010/main" val="0"/>
+              </a:ext>
+            </a:extLst>
+          </a:blip>
+          <a:stretch>
+            <a:fillRect/>
+          </a:stretch>
+        </p:blipFill>
+        <p:spPr>
+          <a:xfrm>
+            <a:off x="9094649" y="4014523"/>
+            <a:ext cx="1445315" cy="1674157"/>
+          </a:xfrm>
+          <a:prstGeom prst="rect">
+            <a:avLst/>
+          </a:prstGeom>
+        </p:spPr>
+      </p:pic>
+      <p:pic>
+        <p:nvPicPr>
+          <p:cNvPr id="13" name="Picture 12" descr="A picture containing black, drawing&#10;&#10;Description automatically generated">
+            <a:hlinkClick r:id="rId3"/>
+            <a:extLst>
+              <a:ext uri="{FF2B5EF4-FFF2-40B4-BE49-F238E27FC236}">
+                <a16:creationId xmlns:a16="http://schemas.microsoft.com/office/drawing/2014/main" id="{8DC45BFF-E8C4-49BE-956A-563D69C3E682}"/>
+              </a:ext>
+            </a:extLst>
+          </p:cNvPr>
+          <p:cNvPicPr>
+            <a:picLocks noChangeAspect="1"/>
+          </p:cNvPicPr>
+          <p:nvPr/>
+        </p:nvPicPr>
+        <p:blipFill>
+          <a:blip r:embed="rId5">
+            <a:extLst>
+              <a:ext uri="{28A0092B-C50C-407E-A947-70E740481C1C}">
+                <a14:useLocalDpi xmlns:a14="http://schemas.microsoft.com/office/drawing/2010/main" val="0"/>
+              </a:ext>
+            </a:extLst>
+          </a:blip>
+          <a:stretch>
+            <a:fillRect/>
+          </a:stretch>
+        </p:blipFill>
+        <p:spPr>
+          <a:xfrm>
+            <a:off x="8398454" y="415210"/>
+            <a:ext cx="2882693" cy="2882693"/>
+          </a:xfrm>
+          <a:prstGeom prst="rect">
+            <a:avLst/>
+          </a:prstGeom>
+        </p:spPr>
+      </p:pic>
+      <p:pic>
+        <p:nvPicPr>
+          <p:cNvPr id="15" name="Picture 14" descr="A close up of a logo&#10;&#10;Description automatically generated">
+            <a:extLst>
+              <a:ext uri="{FF2B5EF4-FFF2-40B4-BE49-F238E27FC236}">
+                <a16:creationId xmlns:a16="http://schemas.microsoft.com/office/drawing/2014/main" id="{FB9A0515-6887-45F8-8420-5DE11D3769F5}"/>
+              </a:ext>
+            </a:extLst>
+          </p:cNvPr>
+          <p:cNvPicPr>
+            <a:picLocks noChangeAspect="1"/>
+          </p:cNvPicPr>
+          <p:nvPr/>
+        </p:nvPicPr>
+        <p:blipFill>
+          <a:blip r:embed="rId6">
+            <a:extLst>
+              <a:ext uri="{28A0092B-C50C-407E-A947-70E740481C1C}">
+                <a14:useLocalDpi xmlns:a14="http://schemas.microsoft.com/office/drawing/2010/main" val="0"/>
+              </a:ext>
+            </a:extLst>
+          </a:blip>
+          <a:stretch>
+            <a:fillRect/>
+          </a:stretch>
+        </p:blipFill>
+        <p:spPr>
+          <a:xfrm rot="14117707">
+            <a:off x="10289010" y="3475443"/>
+            <a:ext cx="1470605" cy="1483619"/>
+          </a:xfrm>
+          <a:prstGeom prst="rect">
+            <a:avLst/>
+          </a:prstGeom>
+        </p:spPr>
+      </p:pic>
+      <p:pic>
+        <p:nvPicPr>
+          <p:cNvPr id="2" name="Picture 1">
+            <a:extLst>
+              <a:ext uri="{FF2B5EF4-FFF2-40B4-BE49-F238E27FC236}">
+                <a16:creationId xmlns:a16="http://schemas.microsoft.com/office/drawing/2014/main" id="{4B3ECD64-5C6D-4621-A306-9F4CD2F8DA7D}"/>
+              </a:ext>
+            </a:extLst>
+          </p:cNvPr>
+          <p:cNvPicPr>
+            <a:picLocks noChangeAspect="1"/>
+          </p:cNvPicPr>
+          <p:nvPr/>
+        </p:nvPicPr>
+        <p:blipFill>
+          <a:blip r:embed="rId7"/>
+          <a:stretch>
+            <a:fillRect/>
+          </a:stretch>
+        </p:blipFill>
+        <p:spPr>
+          <a:xfrm>
+            <a:off x="0" y="0"/>
+            <a:ext cx="7880799" cy="6858000"/>
+          </a:xfrm>
+          <a:prstGeom prst="rect">
+            <a:avLst/>
+          </a:prstGeom>
+        </p:spPr>
+      </p:pic>
+    </p:spTree>
+    <p:extLst>
+      <p:ext uri="{BB962C8B-B14F-4D97-AF65-F5344CB8AC3E}">
+        <p14:creationId xmlns:p14="http://schemas.microsoft.com/office/powerpoint/2010/main" val="3745617488"/>
+      </p:ext>
+    </p:extLst>
+  </p:cSld>
+  <p:clrMapOvr>
+    <a:masterClrMapping/>
+  </p:clrMapOvr>
+</p:sld>
+</file>
+
+<file path=ppt/slides/slide7.xml><?xml version="1.0" encoding="utf-8"?>
+<p:sld xmlns:a="http://schemas.openxmlformats.org/drawingml/2006/main" xmlns:r="http://schemas.openxmlformats.org/officeDocument/2006/relationships" xmlns:p="http://schemas.openxmlformats.org/presentationml/2006/main">
+  <p:cSld>
+    <p:spTree>
+      <p:nvGrpSpPr>
+        <p:cNvPr id="1" name=""/>
+        <p:cNvGrpSpPr/>
+        <p:nvPr/>
+      </p:nvGrpSpPr>
+      <p:grpSpPr>
+        <a:xfrm>
+          <a:off x="0" y="0"/>
+          <a:ext cx="0" cy="0"/>
+          <a:chOff x="0" y="0"/>
+          <a:chExt cx="0" cy="0"/>
+        </a:xfrm>
+      </p:grpSpPr>
+      <p:grpSp>
+        <p:nvGrpSpPr>
+          <p:cNvPr id="11" name="Group 10">
+            <a:extLst>
+              <a:ext uri="{FF2B5EF4-FFF2-40B4-BE49-F238E27FC236}">
+                <a16:creationId xmlns:a16="http://schemas.microsoft.com/office/drawing/2014/main" id="{F7A6FD2B-CABC-4FDA-A3A6-C4157157EF93}"/>
+              </a:ext>
+            </a:extLst>
+          </p:cNvPr>
+          <p:cNvGrpSpPr/>
+          <p:nvPr/>
+        </p:nvGrpSpPr>
+        <p:grpSpPr>
+          <a:xfrm>
+            <a:off x="7599966" y="3006302"/>
+            <a:ext cx="4452830" cy="3851698"/>
+            <a:chOff x="7599966" y="3006302"/>
+            <a:chExt cx="4452830" cy="3851698"/>
+          </a:xfrm>
+        </p:grpSpPr>
+        <p:pic>
+          <p:nvPicPr>
+            <p:cNvPr id="7" name="Picture 6" descr="A picture containing clothing, holding&#10;&#10;Description automatically generated">
+              <a:extLst>
+                <a:ext uri="{FF2B5EF4-FFF2-40B4-BE49-F238E27FC236}">
+                  <a16:creationId xmlns:a16="http://schemas.microsoft.com/office/drawing/2014/main" id="{6794E1C2-97C1-4BB4-B075-1F13439ABD34}"/>
+                </a:ext>
+              </a:extLst>
+            </p:cNvPr>
+            <p:cNvPicPr>
+              <a:picLocks noChangeAspect="1"/>
+            </p:cNvPicPr>
+            <p:nvPr/>
+          </p:nvPicPr>
+          <p:blipFill>
+            <a:blip r:embed="rId2">
+              <a:extLst>
+                <a:ext uri="{28A0092B-C50C-407E-A947-70E740481C1C}">
+                  <a14:useLocalDpi xmlns:a14="http://schemas.microsoft.com/office/drawing/2010/main" val="0"/>
+                </a:ext>
+              </a:extLst>
+            </a:blip>
+            <a:stretch>
+              <a:fillRect/>
+            </a:stretch>
+          </p:blipFill>
+          <p:spPr>
+            <a:xfrm>
+              <a:off x="7599966" y="3006302"/>
+              <a:ext cx="4452830" cy="3851698"/>
+            </a:xfrm>
+            <a:prstGeom prst="rect">
+              <a:avLst/>
+            </a:prstGeom>
+          </p:spPr>
+        </p:pic>
+        <p:sp>
+          <p:nvSpPr>
+            <p:cNvPr id="8" name="Hexagon 7">
+              <a:extLst>
+                <a:ext uri="{FF2B5EF4-FFF2-40B4-BE49-F238E27FC236}">
+                  <a16:creationId xmlns:a16="http://schemas.microsoft.com/office/drawing/2014/main" id="{24575FE9-2970-4439-B52B-5B4C77E954D4}"/>
+                </a:ext>
+              </a:extLst>
+            </p:cNvPr>
+            <p:cNvSpPr/>
+            <p:nvPr/>
+          </p:nvSpPr>
+          <p:spPr>
+            <a:xfrm rot="5400000">
+              <a:off x="9056440" y="4195683"/>
+              <a:ext cx="1521735" cy="1311841"/>
+            </a:xfrm>
+            <a:prstGeom prst="hexagon">
+              <a:avLst/>
+            </a:prstGeom>
+          </p:spPr>
+          <p:style>
+            <a:lnRef idx="2">
+              <a:schemeClr val="dk1">
+                <a:shade val="50000"/>
+              </a:schemeClr>
+            </a:lnRef>
+            <a:fillRef idx="1">
+              <a:schemeClr val="dk1"/>
+            </a:fillRef>
+            <a:effectRef idx="0">
+              <a:schemeClr val="dk1"/>
+            </a:effectRef>
+            <a:fontRef idx="minor">
+              <a:schemeClr val="lt1"/>
+            </a:fontRef>
+          </p:style>
+          <p:txBody>
+            <a:bodyPr rtlCol="0" anchor="ctr"/>
+            <a:lstStyle/>
+            <a:p>
+              <a:pPr algn="ctr"/>
+              <a:endParaRPr lang="pt-BR" dirty="0"/>
+            </a:p>
+          </p:txBody>
+        </p:sp>
+        <p:sp>
+          <p:nvSpPr>
+            <p:cNvPr id="9" name="TextBox 8">
+              <a:extLst>
+                <a:ext uri="{FF2B5EF4-FFF2-40B4-BE49-F238E27FC236}">
+                  <a16:creationId xmlns:a16="http://schemas.microsoft.com/office/drawing/2014/main" id="{115DDE84-D09E-44AC-A701-31074745158F}"/>
+                </a:ext>
+              </a:extLst>
+            </p:cNvPr>
+            <p:cNvSpPr txBox="1"/>
+            <p:nvPr/>
+          </p:nvSpPr>
+          <p:spPr>
+            <a:xfrm>
+              <a:off x="9556114" y="4343771"/>
+              <a:ext cx="540533" cy="1015663"/>
+            </a:xfrm>
+            <a:prstGeom prst="rect">
+              <a:avLst/>
+            </a:prstGeom>
+            <a:noFill/>
+          </p:spPr>
+          <p:txBody>
+            <a:bodyPr wrap="none" rtlCol="0">
+              <a:spAutoFit/>
+            </a:bodyPr>
+            <a:lstStyle/>
+            <a:p>
+              <a:r>
+                <a:rPr lang="pt-BR" sz="6000" dirty="0">
+                  <a:solidFill>
+                    <a:schemeClr val="bg1"/>
+                  </a:solidFill>
+                </a:rPr>
+                <a:t>?</a:t>
+              </a:r>
+            </a:p>
+          </p:txBody>
+        </p:sp>
+      </p:grpSp>
+      <p:pic>
+        <p:nvPicPr>
+          <p:cNvPr id="6" name="Picture 5" descr="A close up of a sign&#10;&#10;Description automatically generated">
+            <a:hlinkClick r:id="rId3"/>
+            <a:extLst>
+              <a:ext uri="{FF2B5EF4-FFF2-40B4-BE49-F238E27FC236}">
+                <a16:creationId xmlns:a16="http://schemas.microsoft.com/office/drawing/2014/main" id="{6BE1DCE9-2C5F-40E2-8FB3-AD07CEFFDA34}"/>
+              </a:ext>
+            </a:extLst>
+          </p:cNvPr>
+          <p:cNvPicPr>
+            <a:picLocks noChangeAspect="1"/>
+          </p:cNvPicPr>
+          <p:nvPr/>
+        </p:nvPicPr>
+        <p:blipFill>
+          <a:blip r:embed="rId4">
+            <a:extLst>
+              <a:ext uri="{28A0092B-C50C-407E-A947-70E740481C1C}">
+                <a14:useLocalDpi xmlns:a14="http://schemas.microsoft.com/office/drawing/2010/main" val="0"/>
+              </a:ext>
+            </a:extLst>
+          </a:blip>
+          <a:stretch>
+            <a:fillRect/>
+          </a:stretch>
+        </p:blipFill>
+        <p:spPr>
+          <a:xfrm>
+            <a:off x="9094649" y="4014523"/>
+            <a:ext cx="1445315" cy="1674157"/>
+          </a:xfrm>
+          <a:prstGeom prst="rect">
+            <a:avLst/>
+          </a:prstGeom>
+        </p:spPr>
+      </p:pic>
+      <p:pic>
+        <p:nvPicPr>
+          <p:cNvPr id="13" name="Picture 12" descr="A picture containing black, drawing&#10;&#10;Description automatically generated">
+            <a:hlinkClick r:id="rId3"/>
+            <a:extLst>
+              <a:ext uri="{FF2B5EF4-FFF2-40B4-BE49-F238E27FC236}">
+                <a16:creationId xmlns:a16="http://schemas.microsoft.com/office/drawing/2014/main" id="{8DC45BFF-E8C4-49BE-956A-563D69C3E682}"/>
+              </a:ext>
+            </a:extLst>
+          </p:cNvPr>
+          <p:cNvPicPr>
+            <a:picLocks noChangeAspect="1"/>
+          </p:cNvPicPr>
+          <p:nvPr/>
+        </p:nvPicPr>
+        <p:blipFill>
+          <a:blip r:embed="rId5">
+            <a:extLst>
+              <a:ext uri="{28A0092B-C50C-407E-A947-70E740481C1C}">
+                <a14:useLocalDpi xmlns:a14="http://schemas.microsoft.com/office/drawing/2010/main" val="0"/>
+              </a:ext>
+            </a:extLst>
+          </a:blip>
+          <a:stretch>
+            <a:fillRect/>
+          </a:stretch>
+        </p:blipFill>
+        <p:spPr>
+          <a:xfrm>
+            <a:off x="8398454" y="415210"/>
+            <a:ext cx="2882693" cy="2882693"/>
+          </a:xfrm>
+          <a:prstGeom prst="rect">
+            <a:avLst/>
+          </a:prstGeom>
+        </p:spPr>
+      </p:pic>
+      <p:pic>
+        <p:nvPicPr>
+          <p:cNvPr id="15" name="Picture 14" descr="A close up of a logo&#10;&#10;Description automatically generated">
+            <a:extLst>
+              <a:ext uri="{FF2B5EF4-FFF2-40B4-BE49-F238E27FC236}">
+                <a16:creationId xmlns:a16="http://schemas.microsoft.com/office/drawing/2014/main" id="{FB9A0515-6887-45F8-8420-5DE11D3769F5}"/>
+              </a:ext>
+            </a:extLst>
+          </p:cNvPr>
+          <p:cNvPicPr>
+            <a:picLocks noChangeAspect="1"/>
+          </p:cNvPicPr>
+          <p:nvPr/>
+        </p:nvPicPr>
+        <p:blipFill>
+          <a:blip r:embed="rId6">
+            <a:extLst>
+              <a:ext uri="{28A0092B-C50C-407E-A947-70E740481C1C}">
+                <a14:useLocalDpi xmlns:a14="http://schemas.microsoft.com/office/drawing/2010/main" val="0"/>
+              </a:ext>
+            </a:extLst>
+          </a:blip>
+          <a:stretch>
+            <a:fillRect/>
+          </a:stretch>
+        </p:blipFill>
+        <p:spPr>
+          <a:xfrm rot="14117707">
+            <a:off x="10289010" y="3475443"/>
+            <a:ext cx="1470605" cy="1483619"/>
+          </a:xfrm>
+          <a:prstGeom prst="rect">
+            <a:avLst/>
+          </a:prstGeom>
+        </p:spPr>
+      </p:pic>
+      <p:pic>
+        <p:nvPicPr>
+          <p:cNvPr id="2" name="Picture 1">
+            <a:extLst>
+              <a:ext uri="{FF2B5EF4-FFF2-40B4-BE49-F238E27FC236}">
+                <a16:creationId xmlns:a16="http://schemas.microsoft.com/office/drawing/2014/main" id="{E4D28A19-AE9C-4AD9-A7BE-F736E0CA47FA}"/>
+              </a:ext>
+            </a:extLst>
+          </p:cNvPr>
+          <p:cNvPicPr>
+            <a:picLocks noChangeAspect="1"/>
+          </p:cNvPicPr>
+          <p:nvPr/>
+        </p:nvPicPr>
+        <p:blipFill>
+          <a:blip r:embed="rId7"/>
+          <a:stretch>
+            <a:fillRect/>
+          </a:stretch>
+        </p:blipFill>
+        <p:spPr>
+          <a:xfrm>
+            <a:off x="0" y="0"/>
+            <a:ext cx="7042180" cy="6858000"/>
+          </a:xfrm>
+          <a:prstGeom prst="rect">
+            <a:avLst/>
+          </a:prstGeom>
+        </p:spPr>
+      </p:pic>
+    </p:spTree>
+    <p:extLst>
+      <p:ext uri="{BB962C8B-B14F-4D97-AF65-F5344CB8AC3E}">
+        <p14:creationId xmlns:p14="http://schemas.microsoft.com/office/powerpoint/2010/main" val="1350972637"/>
+      </p:ext>
+    </p:extLst>
+  </p:cSld>
+  <p:clrMapOvr>
+    <a:masterClrMapping/>
+  </p:clrMapOvr>
+</p:sld>
+</file>
+
+<file path=ppt/slides/slide8.xml><?xml version="1.0" encoding="utf-8"?>
+<p:sld xmlns:a="http://schemas.openxmlformats.org/drawingml/2006/main" xmlns:r="http://schemas.openxmlformats.org/officeDocument/2006/relationships" xmlns:p="http://schemas.openxmlformats.org/presentationml/2006/main">
+  <p:cSld>
+    <p:spTree>
+      <p:nvGrpSpPr>
+        <p:cNvPr id="1" name=""/>
+        <p:cNvGrpSpPr/>
+        <p:nvPr/>
+      </p:nvGrpSpPr>
+      <p:grpSpPr>
+        <a:xfrm>
+          <a:off x="0" y="0"/>
+          <a:ext cx="0" cy="0"/>
+          <a:chOff x="0" y="0"/>
+          <a:chExt cx="0" cy="0"/>
+        </a:xfrm>
+      </p:grpSpPr>
+      <p:grpSp>
+        <p:nvGrpSpPr>
+          <p:cNvPr id="11" name="Group 10">
+            <a:extLst>
+              <a:ext uri="{FF2B5EF4-FFF2-40B4-BE49-F238E27FC236}">
+                <a16:creationId xmlns:a16="http://schemas.microsoft.com/office/drawing/2014/main" id="{F7A6FD2B-CABC-4FDA-A3A6-C4157157EF93}"/>
+              </a:ext>
+            </a:extLst>
+          </p:cNvPr>
+          <p:cNvGrpSpPr/>
+          <p:nvPr/>
+        </p:nvGrpSpPr>
+        <p:grpSpPr>
+          <a:xfrm>
+            <a:off x="7599966" y="3006302"/>
+            <a:ext cx="4452830" cy="3851698"/>
+            <a:chOff x="7599966" y="3006302"/>
+            <a:chExt cx="4452830" cy="3851698"/>
+          </a:xfrm>
+        </p:grpSpPr>
+        <p:pic>
+          <p:nvPicPr>
+            <p:cNvPr id="7" name="Picture 6" descr="A picture containing clothing, holding&#10;&#10;Description automatically generated">
+              <a:extLst>
+                <a:ext uri="{FF2B5EF4-FFF2-40B4-BE49-F238E27FC236}">
+                  <a16:creationId xmlns:a16="http://schemas.microsoft.com/office/drawing/2014/main" id="{6794E1C2-97C1-4BB4-B075-1F13439ABD34}"/>
+                </a:ext>
+              </a:extLst>
+            </p:cNvPr>
+            <p:cNvPicPr>
+              <a:picLocks noChangeAspect="1"/>
+            </p:cNvPicPr>
+            <p:nvPr/>
+          </p:nvPicPr>
+          <p:blipFill>
+            <a:blip r:embed="rId2">
+              <a:extLst>
+                <a:ext uri="{28A0092B-C50C-407E-A947-70E740481C1C}">
+                  <a14:useLocalDpi xmlns:a14="http://schemas.microsoft.com/office/drawing/2010/main" val="0"/>
+                </a:ext>
+              </a:extLst>
+            </a:blip>
+            <a:stretch>
+              <a:fillRect/>
+            </a:stretch>
+          </p:blipFill>
+          <p:spPr>
+            <a:xfrm>
+              <a:off x="7599966" y="3006302"/>
+              <a:ext cx="4452830" cy="3851698"/>
+            </a:xfrm>
+            <a:prstGeom prst="rect">
+              <a:avLst/>
+            </a:prstGeom>
+          </p:spPr>
+        </p:pic>
+        <p:sp>
+          <p:nvSpPr>
+            <p:cNvPr id="8" name="Hexagon 7">
+              <a:extLst>
+                <a:ext uri="{FF2B5EF4-FFF2-40B4-BE49-F238E27FC236}">
+                  <a16:creationId xmlns:a16="http://schemas.microsoft.com/office/drawing/2014/main" id="{24575FE9-2970-4439-B52B-5B4C77E954D4}"/>
+                </a:ext>
+              </a:extLst>
+            </p:cNvPr>
+            <p:cNvSpPr/>
+            <p:nvPr/>
+          </p:nvSpPr>
+          <p:spPr>
+            <a:xfrm rot="5400000">
+              <a:off x="9056440" y="4195683"/>
+              <a:ext cx="1521735" cy="1311841"/>
+            </a:xfrm>
+            <a:prstGeom prst="hexagon">
+              <a:avLst/>
+            </a:prstGeom>
+          </p:spPr>
+          <p:style>
+            <a:lnRef idx="2">
+              <a:schemeClr val="dk1">
+                <a:shade val="50000"/>
+              </a:schemeClr>
+            </a:lnRef>
+            <a:fillRef idx="1">
+              <a:schemeClr val="dk1"/>
+            </a:fillRef>
+            <a:effectRef idx="0">
+              <a:schemeClr val="dk1"/>
+            </a:effectRef>
+            <a:fontRef idx="minor">
+              <a:schemeClr val="lt1"/>
+            </a:fontRef>
+          </p:style>
+          <p:txBody>
+            <a:bodyPr rtlCol="0" anchor="ctr"/>
+            <a:lstStyle/>
+            <a:p>
+              <a:pPr algn="ctr"/>
+              <a:endParaRPr lang="pt-BR" dirty="0"/>
+            </a:p>
+          </p:txBody>
+        </p:sp>
+        <p:sp>
+          <p:nvSpPr>
+            <p:cNvPr id="9" name="TextBox 8">
+              <a:extLst>
+                <a:ext uri="{FF2B5EF4-FFF2-40B4-BE49-F238E27FC236}">
+                  <a16:creationId xmlns:a16="http://schemas.microsoft.com/office/drawing/2014/main" id="{115DDE84-D09E-44AC-A701-31074745158F}"/>
+                </a:ext>
+              </a:extLst>
+            </p:cNvPr>
+            <p:cNvSpPr txBox="1"/>
+            <p:nvPr/>
+          </p:nvSpPr>
+          <p:spPr>
+            <a:xfrm>
+              <a:off x="9556114" y="4343771"/>
+              <a:ext cx="540533" cy="1015663"/>
+            </a:xfrm>
+            <a:prstGeom prst="rect">
+              <a:avLst/>
+            </a:prstGeom>
+            <a:noFill/>
+          </p:spPr>
+          <p:txBody>
+            <a:bodyPr wrap="none" rtlCol="0">
+              <a:spAutoFit/>
+            </a:bodyPr>
+            <a:lstStyle/>
+            <a:p>
+              <a:r>
+                <a:rPr lang="pt-BR" sz="6000" dirty="0">
+                  <a:solidFill>
+                    <a:schemeClr val="bg1"/>
+                  </a:solidFill>
+                </a:rPr>
+                <a:t>?</a:t>
+              </a:r>
+            </a:p>
+          </p:txBody>
+        </p:sp>
+      </p:grpSp>
+      <p:pic>
+        <p:nvPicPr>
+          <p:cNvPr id="6" name="Picture 5" descr="A close up of a sign&#10;&#10;Description automatically generated">
+            <a:hlinkClick r:id="rId3"/>
+            <a:extLst>
+              <a:ext uri="{FF2B5EF4-FFF2-40B4-BE49-F238E27FC236}">
+                <a16:creationId xmlns:a16="http://schemas.microsoft.com/office/drawing/2014/main" id="{6BE1DCE9-2C5F-40E2-8FB3-AD07CEFFDA34}"/>
+              </a:ext>
+            </a:extLst>
+          </p:cNvPr>
+          <p:cNvPicPr>
+            <a:picLocks noChangeAspect="1"/>
+          </p:cNvPicPr>
+          <p:nvPr/>
+        </p:nvPicPr>
+        <p:blipFill>
+          <a:blip r:embed="rId4">
+            <a:extLst>
+              <a:ext uri="{28A0092B-C50C-407E-A947-70E740481C1C}">
+                <a14:useLocalDpi xmlns:a14="http://schemas.microsoft.com/office/drawing/2010/main" val="0"/>
+              </a:ext>
+            </a:extLst>
+          </a:blip>
+          <a:stretch>
+            <a:fillRect/>
+          </a:stretch>
+        </p:blipFill>
+        <p:spPr>
+          <a:xfrm>
+            <a:off x="9094649" y="4014523"/>
+            <a:ext cx="1445315" cy="1674157"/>
+          </a:xfrm>
+          <a:prstGeom prst="rect">
+            <a:avLst/>
+          </a:prstGeom>
+        </p:spPr>
+      </p:pic>
+      <p:pic>
+        <p:nvPicPr>
+          <p:cNvPr id="13" name="Picture 12" descr="A picture containing black, drawing&#10;&#10;Description automatically generated">
+            <a:hlinkClick r:id="rId3"/>
+            <a:extLst>
+              <a:ext uri="{FF2B5EF4-FFF2-40B4-BE49-F238E27FC236}">
+                <a16:creationId xmlns:a16="http://schemas.microsoft.com/office/drawing/2014/main" id="{8DC45BFF-E8C4-49BE-956A-563D69C3E682}"/>
+              </a:ext>
+            </a:extLst>
+          </p:cNvPr>
+          <p:cNvPicPr>
+            <a:picLocks noChangeAspect="1"/>
+          </p:cNvPicPr>
+          <p:nvPr/>
+        </p:nvPicPr>
+        <p:blipFill>
+          <a:blip r:embed="rId5">
+            <a:extLst>
+              <a:ext uri="{28A0092B-C50C-407E-A947-70E740481C1C}">
+                <a14:useLocalDpi xmlns:a14="http://schemas.microsoft.com/office/drawing/2010/main" val="0"/>
+              </a:ext>
+            </a:extLst>
+          </a:blip>
+          <a:stretch>
+            <a:fillRect/>
+          </a:stretch>
+        </p:blipFill>
+        <p:spPr>
+          <a:xfrm>
+            <a:off x="8398454" y="415210"/>
+            <a:ext cx="2882693" cy="2882693"/>
+          </a:xfrm>
+          <a:prstGeom prst="rect">
+            <a:avLst/>
+          </a:prstGeom>
+        </p:spPr>
+      </p:pic>
+      <p:pic>
+        <p:nvPicPr>
+          <p:cNvPr id="15" name="Picture 14" descr="A close up of a logo&#10;&#10;Description automatically generated">
+            <a:extLst>
+              <a:ext uri="{FF2B5EF4-FFF2-40B4-BE49-F238E27FC236}">
+                <a16:creationId xmlns:a16="http://schemas.microsoft.com/office/drawing/2014/main" id="{FB9A0515-6887-45F8-8420-5DE11D3769F5}"/>
+              </a:ext>
+            </a:extLst>
+          </p:cNvPr>
+          <p:cNvPicPr>
+            <a:picLocks noChangeAspect="1"/>
+          </p:cNvPicPr>
+          <p:nvPr/>
+        </p:nvPicPr>
+        <p:blipFill>
+          <a:blip r:embed="rId6">
+            <a:extLst>
+              <a:ext uri="{28A0092B-C50C-407E-A947-70E740481C1C}">
+                <a14:useLocalDpi xmlns:a14="http://schemas.microsoft.com/office/drawing/2010/main" val="0"/>
+              </a:ext>
+            </a:extLst>
+          </a:blip>
+          <a:stretch>
+            <a:fillRect/>
+          </a:stretch>
+        </p:blipFill>
+        <p:spPr>
+          <a:xfrm rot="14117707">
+            <a:off x="10289010" y="3475443"/>
+            <a:ext cx="1470605" cy="1483619"/>
+          </a:xfrm>
+          <a:prstGeom prst="rect">
+            <a:avLst/>
+          </a:prstGeom>
+        </p:spPr>
+      </p:pic>
+      <p:pic>
+        <p:nvPicPr>
+          <p:cNvPr id="2" name="Picture 1">
+            <a:extLst>
+              <a:ext uri="{FF2B5EF4-FFF2-40B4-BE49-F238E27FC236}">
+                <a16:creationId xmlns:a16="http://schemas.microsoft.com/office/drawing/2014/main" id="{12701513-DB1E-4945-AE95-F5BFDDE1698B}"/>
+              </a:ext>
+            </a:extLst>
+          </p:cNvPr>
+          <p:cNvPicPr>
+            <a:picLocks noChangeAspect="1"/>
+          </p:cNvPicPr>
+          <p:nvPr/>
+        </p:nvPicPr>
+        <p:blipFill>
+          <a:blip r:embed="rId7"/>
+          <a:stretch>
+            <a:fillRect/>
+          </a:stretch>
+        </p:blipFill>
+        <p:spPr>
+          <a:xfrm>
+            <a:off x="0" y="0"/>
+            <a:ext cx="7042180" cy="6858000"/>
+          </a:xfrm>
+          <a:prstGeom prst="rect">
+            <a:avLst/>
+          </a:prstGeom>
+        </p:spPr>
+      </p:pic>
+    </p:spTree>
+    <p:extLst>
+      <p:ext uri="{BB962C8B-B14F-4D97-AF65-F5344CB8AC3E}">
+        <p14:creationId xmlns:p14="http://schemas.microsoft.com/office/powerpoint/2010/main" val="3104381926"/>
+      </p:ext>
+    </p:extLst>
+  </p:cSld>
+  <p:clrMapOvr>
+    <a:masterClrMapping/>
+  </p:clrMapOvr>
+</p:sld>
+</file>
+
 <file path=ppt/theme/theme1.xml><?xml version="1.0" encoding="utf-8"?>
 <a:theme xmlns:a="http://schemas.openxmlformats.org/drawingml/2006/main" name="1_Tema do Office">
   <a:themeElements>

</xml_diff>